<commit_message>
Fin relecture steam ?
</commit_message>
<xml_diff>
--- a/04_big_data/99_Project_Steam/steam_project.pptx
+++ b/04_big_data/99_Project_Steam/steam_project.pptx
@@ -5,12 +5,17 @@
     <p:sldMasterId id="2147483660" r:id="rId1"/>
   </p:sldMasterIdLst>
   <p:notesMasterIdLst>
-    <p:notesMasterId r:id="rId5"/>
+    <p:notesMasterId r:id="rId10"/>
   </p:notesMasterIdLst>
   <p:sldIdLst>
     <p:sldId id="256" r:id="rId2"/>
     <p:sldId id="258" r:id="rId3"/>
-    <p:sldId id="257" r:id="rId4"/>
+    <p:sldId id="259" r:id="rId4"/>
+    <p:sldId id="260" r:id="rId5"/>
+    <p:sldId id="261" r:id="rId6"/>
+    <p:sldId id="262" r:id="rId7"/>
+    <p:sldId id="263" r:id="rId8"/>
+    <p:sldId id="257" r:id="rId9"/>
   </p:sldIdLst>
   <p:sldSz cx="12192000" cy="6858000"/>
   <p:notesSz cx="6858000" cy="9144000"/>
@@ -121,7 +126,7 @@
 <p1510:revInfo xmlns:a="http://schemas.openxmlformats.org/drawingml/2006/main" xmlns:r="http://schemas.openxmlformats.org/officeDocument/2006/relationships" xmlns:p1510="http://schemas.microsoft.com/office/powerpoint/2015/10/main">
   <p1510:revLst>
     <p1510:client id="{B2EE689F-2065-402A-8908-926DEA39FEF1}" v="24" dt="2024-08-20T16:47:30.252"/>
-    <p1510:client id="{FB309223-E9E0-44D1-8A29-32821B1882E7}" v="6" dt="2024-08-21T06:25:23.060"/>
+    <p1510:client id="{FB309223-E9E0-44D1-8A29-32821B1882E7}" v="10" dt="2024-08-21T09:47:36.906"/>
   </p1510:revLst>
 </p1510:revInfo>
 </file>
@@ -130,8 +135,8 @@
 <pc:chgInfo xmlns:a="http://schemas.openxmlformats.org/drawingml/2006/main" xmlns:r="http://schemas.openxmlformats.org/officeDocument/2006/relationships" xmlns:ac="http://schemas.microsoft.com/office/drawing/2013/main/command" xmlns:pc="http://schemas.microsoft.com/office/powerpoint/2013/main/command">
   <pc:docChgLst>
     <pc:chgData name="Philippe Baucour" userId="5102170ae7533958" providerId="LiveId" clId="{FB309223-E9E0-44D1-8A29-32821B1882E7}"/>
-    <pc:docChg chg="delSld modSld">
-      <pc:chgData name="Philippe Baucour" userId="5102170ae7533958" providerId="LiveId" clId="{FB309223-E9E0-44D1-8A29-32821B1882E7}" dt="2024-08-21T06:26:10.638" v="27" actId="6549"/>
+    <pc:docChg chg="custSel addSld delSld modSld sldOrd">
+      <pc:chgData name="Philippe Baucour" userId="5102170ae7533958" providerId="LiveId" clId="{FB309223-E9E0-44D1-8A29-32821B1882E7}" dt="2024-08-21T12:23:40.864" v="827" actId="14100"/>
       <pc:docMkLst>
         <pc:docMk/>
       </pc:docMkLst>
@@ -159,13 +164,13 @@
         </pc:spChg>
       </pc:sldChg>
       <pc:sldChg chg="modSp mod">
-        <pc:chgData name="Philippe Baucour" userId="5102170ae7533958" providerId="LiveId" clId="{FB309223-E9E0-44D1-8A29-32821B1882E7}" dt="2024-08-21T06:26:10.638" v="27" actId="6549"/>
+        <pc:chgData name="Philippe Baucour" userId="5102170ae7533958" providerId="LiveId" clId="{FB309223-E9E0-44D1-8A29-32821B1882E7}" dt="2024-08-21T12:22:42.761" v="806" actId="20577"/>
         <pc:sldMkLst>
           <pc:docMk/>
           <pc:sldMk cId="3201622378" sldId="257"/>
         </pc:sldMkLst>
         <pc:spChg chg="mod">
-          <ac:chgData name="Philippe Baucour" userId="5102170ae7533958" providerId="LiveId" clId="{FB309223-E9E0-44D1-8A29-32821B1882E7}" dt="2024-08-21T06:26:10.638" v="27" actId="6549"/>
+          <ac:chgData name="Philippe Baucour" userId="5102170ae7533958" providerId="LiveId" clId="{FB309223-E9E0-44D1-8A29-32821B1882E7}" dt="2024-08-21T12:22:42.761" v="806" actId="20577"/>
           <ac:spMkLst>
             <pc:docMk/>
             <pc:sldMk cId="3201622378" sldId="257"/>
@@ -174,19 +179,66 @@
         </pc:spChg>
       </pc:sldChg>
       <pc:sldChg chg="modSp mod">
-        <pc:chgData name="Philippe Baucour" userId="5102170ae7533958" providerId="LiveId" clId="{FB309223-E9E0-44D1-8A29-32821B1882E7}" dt="2024-08-21T06:25:35.150" v="24" actId="6549"/>
+        <pc:chgData name="Philippe Baucour" userId="5102170ae7533958" providerId="LiveId" clId="{FB309223-E9E0-44D1-8A29-32821B1882E7}" dt="2024-08-21T09:33:23.752" v="122" actId="113"/>
         <pc:sldMkLst>
           <pc:docMk/>
           <pc:sldMk cId="246086491" sldId="258"/>
         </pc:sldMkLst>
         <pc:spChg chg="mod">
-          <ac:chgData name="Philippe Baucour" userId="5102170ae7533958" providerId="LiveId" clId="{FB309223-E9E0-44D1-8A29-32821B1882E7}" dt="2024-08-21T06:25:35.150" v="24" actId="6549"/>
+          <ac:chgData name="Philippe Baucour" userId="5102170ae7533958" providerId="LiveId" clId="{FB309223-E9E0-44D1-8A29-32821B1882E7}" dt="2024-08-21T09:33:23.752" v="122" actId="113"/>
           <ac:spMkLst>
             <pc:docMk/>
             <pc:sldMk cId="246086491" sldId="258"/>
             <ac:spMk id="3" creationId="{A88399CA-BBD6-ECCC-534E-0335C54116C3}"/>
           </ac:spMkLst>
         </pc:spChg>
+      </pc:sldChg>
+      <pc:sldChg chg="addSp delSp modSp new mod">
+        <pc:chgData name="Philippe Baucour" userId="5102170ae7533958" providerId="LiveId" clId="{FB309223-E9E0-44D1-8A29-32821B1882E7}" dt="2024-08-21T09:38:10.829" v="184" actId="20577"/>
+        <pc:sldMkLst>
+          <pc:docMk/>
+          <pc:sldMk cId="892752956" sldId="259"/>
+        </pc:sldMkLst>
+        <pc:spChg chg="mod">
+          <ac:chgData name="Philippe Baucour" userId="5102170ae7533958" providerId="LiveId" clId="{FB309223-E9E0-44D1-8A29-32821B1882E7}" dt="2024-08-21T09:38:10.829" v="184" actId="20577"/>
+          <ac:spMkLst>
+            <pc:docMk/>
+            <pc:sldMk cId="892752956" sldId="259"/>
+            <ac:spMk id="2" creationId="{A024FC35-53CD-88DD-EF44-F283E03E345D}"/>
+          </ac:spMkLst>
+        </pc:spChg>
+        <pc:spChg chg="del">
+          <ac:chgData name="Philippe Baucour" userId="5102170ae7533958" providerId="LiveId" clId="{FB309223-E9E0-44D1-8A29-32821B1882E7}" dt="2024-08-21T07:54:03.478" v="60" actId="22"/>
+          <ac:spMkLst>
+            <pc:docMk/>
+            <pc:sldMk cId="892752956" sldId="259"/>
+            <ac:spMk id="3" creationId="{30646F99-932C-FBA7-BB1E-0F4196096025}"/>
+          </ac:spMkLst>
+        </pc:spChg>
+        <pc:picChg chg="add mod">
+          <ac:chgData name="Philippe Baucour" userId="5102170ae7533958" providerId="LiveId" clId="{FB309223-E9E0-44D1-8A29-32821B1882E7}" dt="2024-08-21T07:57:20.160" v="91" actId="1076"/>
+          <ac:picMkLst>
+            <pc:docMk/>
+            <pc:sldMk cId="892752956" sldId="259"/>
+            <ac:picMk id="5" creationId="{5ABBF3DD-A119-B54D-5723-943BC572AD06}"/>
+          </ac:picMkLst>
+        </pc:picChg>
+        <pc:picChg chg="add mod ord">
+          <ac:chgData name="Philippe Baucour" userId="5102170ae7533958" providerId="LiveId" clId="{FB309223-E9E0-44D1-8A29-32821B1882E7}" dt="2024-08-21T07:57:24.875" v="92" actId="1076"/>
+          <ac:picMkLst>
+            <pc:docMk/>
+            <pc:sldMk cId="892752956" sldId="259"/>
+            <ac:picMk id="7" creationId="{D3600613-DF05-C919-931A-D6FF20B36C7C}"/>
+          </ac:picMkLst>
+        </pc:picChg>
+        <pc:picChg chg="add mod">
+          <ac:chgData name="Philippe Baucour" userId="5102170ae7533958" providerId="LiveId" clId="{FB309223-E9E0-44D1-8A29-32821B1882E7}" dt="2024-08-21T07:57:05.575" v="89" actId="1076"/>
+          <ac:picMkLst>
+            <pc:docMk/>
+            <pc:sldMk cId="892752956" sldId="259"/>
+            <ac:picMk id="9" creationId="{5893ECF7-2F64-1068-FA39-5C705A8BDF9C}"/>
+          </ac:picMkLst>
+        </pc:picChg>
       </pc:sldChg>
       <pc:sldChg chg="del">
         <pc:chgData name="Philippe Baucour" userId="5102170ae7533958" providerId="LiveId" clId="{FB309223-E9E0-44D1-8A29-32821B1882E7}" dt="2024-08-21T06:25:51.407" v="26" actId="47"/>
@@ -202,12 +254,160 @@
           <pc:sldMk cId="3605500931" sldId="260"/>
         </pc:sldMkLst>
       </pc:sldChg>
+      <pc:sldChg chg="addSp new mod modShow">
+        <pc:chgData name="Philippe Baucour" userId="5102170ae7533958" providerId="LiveId" clId="{FB309223-E9E0-44D1-8A29-32821B1882E7}" dt="2024-08-21T09:34:57.080" v="123" actId="729"/>
+        <pc:sldMkLst>
+          <pc:docMk/>
+          <pc:sldMk cId="3990801946" sldId="260"/>
+        </pc:sldMkLst>
+        <pc:picChg chg="add">
+          <ac:chgData name="Philippe Baucour" userId="5102170ae7533958" providerId="LiveId" clId="{FB309223-E9E0-44D1-8A29-32821B1882E7}" dt="2024-08-21T08:14:44.970" v="94" actId="22"/>
+          <ac:picMkLst>
+            <pc:docMk/>
+            <pc:sldMk cId="3990801946" sldId="260"/>
+            <ac:picMk id="5" creationId="{8B75FBC1-EA90-D2FE-23A0-F3731B5A3809}"/>
+          </ac:picMkLst>
+        </pc:picChg>
+      </pc:sldChg>
       <pc:sldChg chg="del">
         <pc:chgData name="Philippe Baucour" userId="5102170ae7533958" providerId="LiveId" clId="{FB309223-E9E0-44D1-8A29-32821B1882E7}" dt="2024-08-21T06:25:44.400" v="25" actId="47"/>
         <pc:sldMkLst>
           <pc:docMk/>
           <pc:sldMk cId="1735660937" sldId="261"/>
         </pc:sldMkLst>
+      </pc:sldChg>
+      <pc:sldChg chg="addSp modSp new mod">
+        <pc:chgData name="Philippe Baucour" userId="5102170ae7533958" providerId="LiveId" clId="{FB309223-E9E0-44D1-8A29-32821B1882E7}" dt="2024-08-21T09:43:32.664" v="374" actId="1076"/>
+        <pc:sldMkLst>
+          <pc:docMk/>
+          <pc:sldMk cId="3454558438" sldId="261"/>
+        </pc:sldMkLst>
+        <pc:spChg chg="mod">
+          <ac:chgData name="Philippe Baucour" userId="5102170ae7533958" providerId="LiveId" clId="{FB309223-E9E0-44D1-8A29-32821B1882E7}" dt="2024-08-21T09:38:50.907" v="219" actId="20577"/>
+          <ac:spMkLst>
+            <pc:docMk/>
+            <pc:sldMk cId="3454558438" sldId="261"/>
+            <ac:spMk id="2" creationId="{935C78F2-E436-8ADF-CE5B-66BF45E9E568}"/>
+          </ac:spMkLst>
+        </pc:spChg>
+        <pc:spChg chg="mod">
+          <ac:chgData name="Philippe Baucour" userId="5102170ae7533958" providerId="LiveId" clId="{FB309223-E9E0-44D1-8A29-32821B1882E7}" dt="2024-08-21T09:41:22.792" v="363" actId="20577"/>
+          <ac:spMkLst>
+            <pc:docMk/>
+            <pc:sldMk cId="3454558438" sldId="261"/>
+            <ac:spMk id="3" creationId="{E734364D-B34D-5F15-6CEE-9DA8E3E22AF4}"/>
+          </ac:spMkLst>
+        </pc:spChg>
+        <pc:spChg chg="add mod">
+          <ac:chgData name="Philippe Baucour" userId="5102170ae7533958" providerId="LiveId" clId="{FB309223-E9E0-44D1-8A29-32821B1882E7}" dt="2024-08-21T09:43:16.703" v="370" actId="1076"/>
+          <ac:spMkLst>
+            <pc:docMk/>
+            <pc:sldMk cId="3454558438" sldId="261"/>
+            <ac:spMk id="6" creationId="{C766939B-CC16-7C21-D857-130CDCE09F8D}"/>
+          </ac:spMkLst>
+        </pc:spChg>
+        <pc:spChg chg="add mod">
+          <ac:chgData name="Philippe Baucour" userId="5102170ae7533958" providerId="LiveId" clId="{FB309223-E9E0-44D1-8A29-32821B1882E7}" dt="2024-08-21T09:43:32.664" v="374" actId="1076"/>
+          <ac:spMkLst>
+            <pc:docMk/>
+            <pc:sldMk cId="3454558438" sldId="261"/>
+            <ac:spMk id="7" creationId="{18BC7FE4-5F78-D634-4263-6FA6A93BA047}"/>
+          </ac:spMkLst>
+        </pc:spChg>
+        <pc:picChg chg="add mod">
+          <ac:chgData name="Philippe Baucour" userId="5102170ae7533958" providerId="LiveId" clId="{FB309223-E9E0-44D1-8A29-32821B1882E7}" dt="2024-08-21T09:36:25.164" v="128" actId="14100"/>
+          <ac:picMkLst>
+            <pc:docMk/>
+            <pc:sldMk cId="3454558438" sldId="261"/>
+            <ac:picMk id="5" creationId="{2795080A-F80C-CE36-490B-9B7C1D2E065F}"/>
+          </ac:picMkLst>
+        </pc:picChg>
+      </pc:sldChg>
+      <pc:sldChg chg="addSp modSp new mod">
+        <pc:chgData name="Philippe Baucour" userId="5102170ae7533958" providerId="LiveId" clId="{FB309223-E9E0-44D1-8A29-32821B1882E7}" dt="2024-08-21T09:50:30.265" v="615" actId="1076"/>
+        <pc:sldMkLst>
+          <pc:docMk/>
+          <pc:sldMk cId="2740920124" sldId="262"/>
+        </pc:sldMkLst>
+        <pc:spChg chg="mod">
+          <ac:chgData name="Philippe Baucour" userId="5102170ae7533958" providerId="LiveId" clId="{FB309223-E9E0-44D1-8A29-32821B1882E7}" dt="2024-08-21T09:43:57.239" v="376"/>
+          <ac:spMkLst>
+            <pc:docMk/>
+            <pc:sldMk cId="2740920124" sldId="262"/>
+            <ac:spMk id="2" creationId="{54A1E88B-4A50-17FA-A85B-9497818A7071}"/>
+          </ac:spMkLst>
+        </pc:spChg>
+        <pc:spChg chg="mod">
+          <ac:chgData name="Philippe Baucour" userId="5102170ae7533958" providerId="LiveId" clId="{FB309223-E9E0-44D1-8A29-32821B1882E7}" dt="2024-08-21T09:50:20.789" v="614" actId="20577"/>
+          <ac:spMkLst>
+            <pc:docMk/>
+            <pc:sldMk cId="2740920124" sldId="262"/>
+            <ac:spMk id="3" creationId="{0006FB1E-E832-F506-45C7-50EE301D0B05}"/>
+          </ac:spMkLst>
+        </pc:spChg>
+        <pc:spChg chg="add mod">
+          <ac:chgData name="Philippe Baucour" userId="5102170ae7533958" providerId="LiveId" clId="{FB309223-E9E0-44D1-8A29-32821B1882E7}" dt="2024-08-21T09:50:30.265" v="615" actId="1076"/>
+          <ac:spMkLst>
+            <pc:docMk/>
+            <pc:sldMk cId="2740920124" sldId="262"/>
+            <ac:spMk id="6" creationId="{319E57BF-83E8-D8F8-033F-120C2C1D92A1}"/>
+          </ac:spMkLst>
+        </pc:spChg>
+        <pc:spChg chg="add mod">
+          <ac:chgData name="Philippe Baucour" userId="5102170ae7533958" providerId="LiveId" clId="{FB309223-E9E0-44D1-8A29-32821B1882E7}" dt="2024-08-21T09:47:45.925" v="448" actId="1076"/>
+          <ac:spMkLst>
+            <pc:docMk/>
+            <pc:sldMk cId="2740920124" sldId="262"/>
+            <ac:spMk id="7" creationId="{ADDDD8F1-8EC5-0A67-E1C4-FDF4AD008E81}"/>
+          </ac:spMkLst>
+        </pc:spChg>
+        <pc:picChg chg="add mod">
+          <ac:chgData name="Philippe Baucour" userId="5102170ae7533958" providerId="LiveId" clId="{FB309223-E9E0-44D1-8A29-32821B1882E7}" dt="2024-08-21T09:46:32.437" v="396" actId="14100"/>
+          <ac:picMkLst>
+            <pc:docMk/>
+            <pc:sldMk cId="2740920124" sldId="262"/>
+            <ac:picMk id="5" creationId="{81520DF2-72B8-6F56-80CE-7A098C984E5F}"/>
+          </ac:picMkLst>
+        </pc:picChg>
+      </pc:sldChg>
+      <pc:sldChg chg="addSp delSp modSp new mod ord modClrScheme chgLayout">
+        <pc:chgData name="Philippe Baucour" userId="5102170ae7533958" providerId="LiveId" clId="{FB309223-E9E0-44D1-8A29-32821B1882E7}" dt="2024-08-21T12:23:40.864" v="827" actId="14100"/>
+        <pc:sldMkLst>
+          <pc:docMk/>
+          <pc:sldMk cId="312535264" sldId="263"/>
+        </pc:sldMkLst>
+        <pc:spChg chg="del mod ord">
+          <ac:chgData name="Philippe Baucour" userId="5102170ae7533958" providerId="LiveId" clId="{FB309223-E9E0-44D1-8A29-32821B1882E7}" dt="2024-08-21T12:23:17.064" v="810" actId="700"/>
+          <ac:spMkLst>
+            <pc:docMk/>
+            <pc:sldMk cId="312535264" sldId="263"/>
+            <ac:spMk id="2" creationId="{F4044EF5-9ECC-76E9-63AF-0F02E108A35A}"/>
+          </ac:spMkLst>
+        </pc:spChg>
+        <pc:spChg chg="del mod ord">
+          <ac:chgData name="Philippe Baucour" userId="5102170ae7533958" providerId="LiveId" clId="{FB309223-E9E0-44D1-8A29-32821B1882E7}" dt="2024-08-21T12:23:17.064" v="810" actId="700"/>
+          <ac:spMkLst>
+            <pc:docMk/>
+            <pc:sldMk cId="312535264" sldId="263"/>
+            <ac:spMk id="3" creationId="{B776B5C4-87EF-3C6D-B666-D729B83914A9}"/>
+          </ac:spMkLst>
+        </pc:spChg>
+        <pc:spChg chg="add mod ord">
+          <ac:chgData name="Philippe Baucour" userId="5102170ae7533958" providerId="LiveId" clId="{FB309223-E9E0-44D1-8A29-32821B1882E7}" dt="2024-08-21T12:23:40.864" v="827" actId="14100"/>
+          <ac:spMkLst>
+            <pc:docMk/>
+            <pc:sldMk cId="312535264" sldId="263"/>
+            <ac:spMk id="4" creationId="{80E590DF-0A88-7056-85D1-A8E809E2318F}"/>
+          </ac:spMkLst>
+        </pc:spChg>
+        <pc:spChg chg="add mod ord">
+          <ac:chgData name="Philippe Baucour" userId="5102170ae7533958" providerId="LiveId" clId="{FB309223-E9E0-44D1-8A29-32821B1882E7}" dt="2024-08-21T12:23:17.064" v="810" actId="700"/>
+          <ac:spMkLst>
+            <pc:docMk/>
+            <pc:sldMk cId="312535264" sldId="263"/>
+            <ac:spMk id="5" creationId="{64E8BF61-007C-0740-1AA1-06B9449B33C7}"/>
+          </ac:spMkLst>
+        </pc:spChg>
       </pc:sldChg>
       <pc:sldChg chg="del">
         <pc:chgData name="Philippe Baucour" userId="5102170ae7533958" providerId="LiveId" clId="{FB309223-E9E0-44D1-8A29-32821B1882E7}" dt="2024-08-21T06:25:44.400" v="25" actId="47"/>
@@ -5042,11 +5242,113 @@
         <p:spPr/>
         <p:txBody>
           <a:bodyPr>
-            <a:normAutofit/>
+            <a:normAutofit fontScale="55000" lnSpcReduction="20000"/>
           </a:bodyPr>
           <a:lstStyle/>
           <a:p>
-            <a:endParaRPr lang="en-US" dirty="0"/>
+            <a:pPr marL="0" indent="0">
+              <a:buNone/>
+            </a:pPr>
+            <a:r>
+              <a:rPr lang="en-US" b="1" dirty="0"/>
+              <a:t>Analysis at the "macro" level</a:t>
+            </a:r>
+          </a:p>
+          <a:p>
+            <a:r>
+              <a:rPr lang="en-US" dirty="0"/>
+              <a:t>Which publisher has released the most games on Steam?</a:t>
+            </a:r>
+          </a:p>
+          <a:p>
+            <a:r>
+              <a:rPr lang="en-US" dirty="0"/>
+              <a:t>What are the best rated games?</a:t>
+            </a:r>
+          </a:p>
+          <a:p>
+            <a:r>
+              <a:rPr lang="en-US" dirty="0"/>
+              <a:t>Are there years with more releases? Were there more or fewer game releases during the Covid, for example?</a:t>
+            </a:r>
+          </a:p>
+          <a:p>
+            <a:r>
+              <a:rPr lang="en-US" dirty="0"/>
+              <a:t>How are the prizes distributed? Are there many games with a discount?</a:t>
+            </a:r>
+          </a:p>
+          <a:p>
+            <a:r>
+              <a:rPr lang="en-US" dirty="0"/>
+              <a:t>What are the most represented languages?</a:t>
+            </a:r>
+          </a:p>
+          <a:p>
+            <a:r>
+              <a:rPr lang="en-US" dirty="0"/>
+              <a:t>Are there many games prohibited for children under 16/18?</a:t>
+            </a:r>
+          </a:p>
+          <a:p>
+            <a:pPr marL="0" indent="0">
+              <a:buNone/>
+            </a:pPr>
+            <a:r>
+              <a:rPr lang="en-US" b="1" dirty="0"/>
+              <a:t>Genres analysis</a:t>
+            </a:r>
+          </a:p>
+          <a:p>
+            <a:r>
+              <a:rPr lang="en-US" dirty="0"/>
+              <a:t>What are the most represented genres?</a:t>
+            </a:r>
+          </a:p>
+          <a:p>
+            <a:r>
+              <a:rPr lang="en-US" dirty="0"/>
+              <a:t>Are there any genres that have a better positive/negative review ratio?</a:t>
+            </a:r>
+          </a:p>
+          <a:p>
+            <a:r>
+              <a:rPr lang="en-US" dirty="0"/>
+              <a:t>Do some publishers have favorite genres?</a:t>
+            </a:r>
+          </a:p>
+          <a:p>
+            <a:r>
+              <a:rPr lang="en-US" dirty="0"/>
+              <a:t>What are the most lucrative genres?</a:t>
+            </a:r>
+          </a:p>
+          <a:p>
+            <a:pPr marL="0" indent="0">
+              <a:buNone/>
+            </a:pPr>
+            <a:r>
+              <a:rPr lang="en-US" b="1" dirty="0"/>
+              <a:t>Platform analysis</a:t>
+            </a:r>
+          </a:p>
+          <a:p>
+            <a:r>
+              <a:rPr lang="en-US" dirty="0"/>
+              <a:t>Are most games available on Windows/Mac/Linux instead?</a:t>
+            </a:r>
+          </a:p>
+          <a:p>
+            <a:r>
+              <a:rPr lang="en-US" dirty="0"/>
+              <a:t>Do certain genres tend to be preferentially available on certain platforms?</a:t>
+            </a:r>
+          </a:p>
+          <a:p>
+            <a:r>
+              <a:rPr lang="en-US" dirty="0"/>
+              <a:t>You're free to follow these guidelines, or to choose a different angle of analysis, as long as your analysis reveals relevant and useful information. 🤓</a:t>
+            </a:r>
           </a:p>
         </p:txBody>
       </p:sp>
@@ -5085,7 +5387,205 @@
           <p:cNvPr id="2" name="Titre 1">
             <a:extLst>
               <a:ext uri="{FF2B5EF4-FFF2-40B4-BE49-F238E27FC236}">
-                <a16:creationId xmlns:a16="http://schemas.microsoft.com/office/drawing/2014/main" id="{F13D07B4-C7D9-46E1-38A0-A6EEF16B48EB}"/>
+                <a16:creationId xmlns:a16="http://schemas.microsoft.com/office/drawing/2014/main" id="{A024FC35-53CD-88DD-EF44-F283E03E345D}"/>
+              </a:ext>
+            </a:extLst>
+          </p:cNvPr>
+          <p:cNvSpPr>
+            <a:spLocks noGrp="1"/>
+          </p:cNvSpPr>
+          <p:nvPr>
+            <p:ph type="title"/>
+          </p:nvPr>
+        </p:nvSpPr>
+        <p:spPr/>
+        <p:txBody>
+          <a:bodyPr>
+            <a:normAutofit/>
+          </a:bodyPr>
+          <a:lstStyle/>
+          <a:p>
+            <a:r>
+              <a:rPr lang="fr-FR" dirty="0" err="1"/>
+              <a:t>Create</a:t>
+            </a:r>
+            <a:r>
+              <a:rPr lang="fr-FR" dirty="0"/>
+              <a:t> a </a:t>
+            </a:r>
+            <a:r>
+              <a:rPr lang="fr-FR" dirty="0" err="1"/>
+              <a:t>computing</a:t>
+            </a:r>
+            <a:r>
+              <a:rPr lang="fr-FR" dirty="0"/>
+              <a:t> </a:t>
+            </a:r>
+            <a:r>
+              <a:rPr lang="fr-FR" dirty="0" err="1"/>
+              <a:t>resource</a:t>
+            </a:r>
+            <a:r>
+              <a:rPr lang="fr-FR" dirty="0"/>
+              <a:t> on </a:t>
+            </a:r>
+            <a:r>
+              <a:rPr lang="fr-FR" dirty="0" err="1"/>
+              <a:t>Databricks</a:t>
+            </a:r>
+            <a:endParaRPr lang="fr-FR" dirty="0"/>
+          </a:p>
+        </p:txBody>
+      </p:sp>
+      <p:pic>
+        <p:nvPicPr>
+          <p:cNvPr id="5" name="Image 4">
+            <a:extLst>
+              <a:ext uri="{FF2B5EF4-FFF2-40B4-BE49-F238E27FC236}">
+                <a16:creationId xmlns:a16="http://schemas.microsoft.com/office/drawing/2014/main" id="{5ABBF3DD-A119-B54D-5723-943BC572AD06}"/>
+              </a:ext>
+            </a:extLst>
+          </p:cNvPr>
+          <p:cNvPicPr>
+            <a:picLocks noChangeAspect="1"/>
+          </p:cNvPicPr>
+          <p:nvPr/>
+        </p:nvPicPr>
+        <p:blipFill>
+          <a:blip r:embed="rId2"/>
+          <a:stretch>
+            <a:fillRect/>
+          </a:stretch>
+        </p:blipFill>
+        <p:spPr>
+          <a:xfrm>
+            <a:off x="132920" y="1025065"/>
+            <a:ext cx="8007471" cy="3292098"/>
+          </a:xfrm>
+          <a:prstGeom prst="rect">
+            <a:avLst/>
+          </a:prstGeom>
+          <a:effectLst>
+            <a:outerShdw blurRad="50800" dist="38100" dir="2700000" algn="tl" rotWithShape="0">
+              <a:prstClr val="black">
+                <a:alpha val="40000"/>
+              </a:prstClr>
+            </a:outerShdw>
+          </a:effectLst>
+        </p:spPr>
+      </p:pic>
+      <p:pic>
+        <p:nvPicPr>
+          <p:cNvPr id="7" name="Espace réservé du contenu 6">
+            <a:extLst>
+              <a:ext uri="{FF2B5EF4-FFF2-40B4-BE49-F238E27FC236}">
+                <a16:creationId xmlns:a16="http://schemas.microsoft.com/office/drawing/2014/main" id="{D3600613-DF05-C919-931A-D6FF20B36C7C}"/>
+              </a:ext>
+            </a:extLst>
+          </p:cNvPr>
+          <p:cNvPicPr>
+            <a:picLocks noGrp="1" noChangeAspect="1"/>
+          </p:cNvPicPr>
+          <p:nvPr>
+            <p:ph idx="1"/>
+          </p:nvPr>
+        </p:nvPicPr>
+        <p:blipFill>
+          <a:blip r:embed="rId3"/>
+          <a:stretch>
+            <a:fillRect/>
+          </a:stretch>
+        </p:blipFill>
+        <p:spPr>
+          <a:xfrm>
+            <a:off x="3781657" y="2934749"/>
+            <a:ext cx="5229758" cy="1754121"/>
+          </a:xfrm>
+          <a:prstGeom prst="rect">
+            <a:avLst/>
+          </a:prstGeom>
+          <a:effectLst>
+            <a:outerShdw blurRad="50800" dist="38100" dir="2700000" algn="tl" rotWithShape="0">
+              <a:prstClr val="black">
+                <a:alpha val="40000"/>
+              </a:prstClr>
+            </a:outerShdw>
+          </a:effectLst>
+        </p:spPr>
+      </p:pic>
+      <p:pic>
+        <p:nvPicPr>
+          <p:cNvPr id="9" name="Image 8">
+            <a:extLst>
+              <a:ext uri="{FF2B5EF4-FFF2-40B4-BE49-F238E27FC236}">
+                <a16:creationId xmlns:a16="http://schemas.microsoft.com/office/drawing/2014/main" id="{5893ECF7-2F64-1068-FA39-5C705A8BDF9C}"/>
+              </a:ext>
+            </a:extLst>
+          </p:cNvPr>
+          <p:cNvPicPr>
+            <a:picLocks noChangeAspect="1"/>
+          </p:cNvPicPr>
+          <p:nvPr/>
+        </p:nvPicPr>
+        <p:blipFill>
+          <a:blip r:embed="rId4"/>
+          <a:stretch>
+            <a:fillRect/>
+          </a:stretch>
+        </p:blipFill>
+        <p:spPr>
+          <a:xfrm>
+            <a:off x="7802777" y="3443497"/>
+            <a:ext cx="4175863" cy="3260660"/>
+          </a:xfrm>
+          <a:prstGeom prst="rect">
+            <a:avLst/>
+          </a:prstGeom>
+          <a:effectLst>
+            <a:outerShdw blurRad="50800" dist="38100" dir="2700000" algn="tl" rotWithShape="0">
+              <a:prstClr val="black">
+                <a:alpha val="40000"/>
+              </a:prstClr>
+            </a:outerShdw>
+          </a:effectLst>
+        </p:spPr>
+      </p:pic>
+    </p:spTree>
+    <p:extLst>
+      <p:ext uri="{BB962C8B-B14F-4D97-AF65-F5344CB8AC3E}">
+        <p14:creationId xmlns:p14="http://schemas.microsoft.com/office/powerpoint/2010/main" val="892752956"/>
+      </p:ext>
+    </p:extLst>
+  </p:cSld>
+  <p:clrMapOvr>
+    <a:masterClrMapping/>
+  </p:clrMapOvr>
+</p:sld>
+</file>
+
+<file path=ppt/slides/slide4.xml><?xml version="1.0" encoding="utf-8"?>
+<p:sld xmlns:a="http://schemas.openxmlformats.org/drawingml/2006/main" xmlns:r="http://schemas.openxmlformats.org/officeDocument/2006/relationships" xmlns:p="http://schemas.openxmlformats.org/presentationml/2006/main" show="0">
+  <p:cSld>
+    <p:spTree>
+      <p:nvGrpSpPr>
+        <p:cNvPr id="1" name=""/>
+        <p:cNvGrpSpPr/>
+        <p:nvPr/>
+      </p:nvGrpSpPr>
+      <p:grpSpPr>
+        <a:xfrm>
+          <a:off x="0" y="0"/>
+          <a:ext cx="0" cy="0"/>
+          <a:chOff x="0" y="0"/>
+          <a:chExt cx="0" cy="0"/>
+        </a:xfrm>
+      </p:grpSpPr>
+      <p:sp>
+        <p:nvSpPr>
+          <p:cNvPr id="2" name="Titre 1">
+            <a:extLst>
+              <a:ext uri="{FF2B5EF4-FFF2-40B4-BE49-F238E27FC236}">
+                <a16:creationId xmlns:a16="http://schemas.microsoft.com/office/drawing/2014/main" id="{EB6098DA-32DB-ABC0-4DF9-6A9E9785D4CD}"/>
               </a:ext>
             </a:extLst>
           </p:cNvPr>
@@ -5101,6 +5601,792 @@
           <a:bodyPr/>
           <a:lstStyle/>
           <a:p>
+            <a:endParaRPr lang="fr-FR"/>
+          </a:p>
+        </p:txBody>
+      </p:sp>
+      <p:sp>
+        <p:nvSpPr>
+          <p:cNvPr id="3" name="Espace réservé du contenu 2">
+            <a:extLst>
+              <a:ext uri="{FF2B5EF4-FFF2-40B4-BE49-F238E27FC236}">
+                <a16:creationId xmlns:a16="http://schemas.microsoft.com/office/drawing/2014/main" id="{755391E4-9E7C-61D2-947A-0F2B2AE6197D}"/>
+              </a:ext>
+            </a:extLst>
+          </p:cNvPr>
+          <p:cNvSpPr>
+            <a:spLocks noGrp="1"/>
+          </p:cNvSpPr>
+          <p:nvPr>
+            <p:ph idx="1"/>
+          </p:nvPr>
+        </p:nvSpPr>
+        <p:spPr/>
+        <p:txBody>
+          <a:bodyPr/>
+          <a:lstStyle/>
+          <a:p>
+            <a:endParaRPr lang="fr-FR"/>
+          </a:p>
+        </p:txBody>
+      </p:sp>
+      <p:pic>
+        <p:nvPicPr>
+          <p:cNvPr id="5" name="Image 4">
+            <a:extLst>
+              <a:ext uri="{FF2B5EF4-FFF2-40B4-BE49-F238E27FC236}">
+                <a16:creationId xmlns:a16="http://schemas.microsoft.com/office/drawing/2014/main" id="{8B75FBC1-EA90-D2FE-23A0-F3731B5A3809}"/>
+              </a:ext>
+            </a:extLst>
+          </p:cNvPr>
+          <p:cNvPicPr>
+            <a:picLocks noChangeAspect="1"/>
+          </p:cNvPicPr>
+          <p:nvPr/>
+        </p:nvPicPr>
+        <p:blipFill>
+          <a:blip r:embed="rId2"/>
+          <a:stretch>
+            <a:fillRect/>
+          </a:stretch>
+        </p:blipFill>
+        <p:spPr>
+          <a:xfrm>
+            <a:off x="1342361" y="1195075"/>
+            <a:ext cx="9507277" cy="4467849"/>
+          </a:xfrm>
+          <a:prstGeom prst="rect">
+            <a:avLst/>
+          </a:prstGeom>
+        </p:spPr>
+      </p:pic>
+    </p:spTree>
+    <p:extLst>
+      <p:ext uri="{BB962C8B-B14F-4D97-AF65-F5344CB8AC3E}">
+        <p14:creationId xmlns:p14="http://schemas.microsoft.com/office/powerpoint/2010/main" val="3990801946"/>
+      </p:ext>
+    </p:extLst>
+  </p:cSld>
+  <p:clrMapOvr>
+    <a:masterClrMapping/>
+  </p:clrMapOvr>
+</p:sld>
+</file>
+
+<file path=ppt/slides/slide5.xml><?xml version="1.0" encoding="utf-8"?>
+<p:sld xmlns:a="http://schemas.openxmlformats.org/drawingml/2006/main" xmlns:r="http://schemas.openxmlformats.org/officeDocument/2006/relationships" xmlns:p="http://schemas.openxmlformats.org/presentationml/2006/main">
+  <p:cSld>
+    <p:spTree>
+      <p:nvGrpSpPr>
+        <p:cNvPr id="1" name=""/>
+        <p:cNvGrpSpPr/>
+        <p:nvPr/>
+      </p:nvGrpSpPr>
+      <p:grpSpPr>
+        <a:xfrm>
+          <a:off x="0" y="0"/>
+          <a:ext cx="0" cy="0"/>
+          <a:chOff x="0" y="0"/>
+          <a:chExt cx="0" cy="0"/>
+        </a:xfrm>
+      </p:grpSpPr>
+      <p:sp>
+        <p:nvSpPr>
+          <p:cNvPr id="2" name="Titre 1">
+            <a:extLst>
+              <a:ext uri="{FF2B5EF4-FFF2-40B4-BE49-F238E27FC236}">
+                <a16:creationId xmlns:a16="http://schemas.microsoft.com/office/drawing/2014/main" id="{935C78F2-E436-8ADF-CE5B-66BF45E9E568}"/>
+              </a:ext>
+            </a:extLst>
+          </p:cNvPr>
+          <p:cNvSpPr>
+            <a:spLocks noGrp="1"/>
+          </p:cNvSpPr>
+          <p:nvPr>
+            <p:ph type="title"/>
+          </p:nvPr>
+        </p:nvSpPr>
+        <p:spPr/>
+        <p:txBody>
+          <a:bodyPr/>
+          <a:lstStyle/>
+          <a:p>
+            <a:r>
+              <a:rPr lang="fr-FR" dirty="0"/>
+              <a:t>About the notebooks</a:t>
+            </a:r>
+          </a:p>
+        </p:txBody>
+      </p:sp>
+      <p:sp>
+        <p:nvSpPr>
+          <p:cNvPr id="3" name="Espace réservé du contenu 2">
+            <a:extLst>
+              <a:ext uri="{FF2B5EF4-FFF2-40B4-BE49-F238E27FC236}">
+                <a16:creationId xmlns:a16="http://schemas.microsoft.com/office/drawing/2014/main" id="{E734364D-B34D-5F15-6CEE-9DA8E3E22AF4}"/>
+              </a:ext>
+            </a:extLst>
+          </p:cNvPr>
+          <p:cNvSpPr>
+            <a:spLocks noGrp="1"/>
+          </p:cNvSpPr>
+          <p:nvPr>
+            <p:ph idx="1"/>
+          </p:nvPr>
+        </p:nvSpPr>
+        <p:spPr>
+          <a:xfrm>
+            <a:off x="5643563" y="1249680"/>
+            <a:ext cx="6335077" cy="4927283"/>
+          </a:xfrm>
+        </p:spPr>
+        <p:txBody>
+          <a:bodyPr/>
+          <a:lstStyle/>
+          <a:p>
+            <a:r>
+              <a:rPr lang="fr-FR" dirty="0"/>
+              <a:t>One notebook per group of questions (macro, genres, platforms)</a:t>
+            </a:r>
+          </a:p>
+          <a:p>
+            <a:r>
+              <a:rPr lang="fr-FR" dirty="0"/>
+              <a:t>Questions are </a:t>
+            </a:r>
+            <a:r>
+              <a:rPr lang="fr-FR" dirty="0" err="1"/>
+              <a:t>listed</a:t>
+            </a:r>
+            <a:endParaRPr lang="fr-FR" dirty="0"/>
+          </a:p>
+          <a:p>
+            <a:r>
+              <a:rPr lang="fr-FR" dirty="0" err="1"/>
+              <a:t>Then</a:t>
+            </a:r>
+            <a:r>
+              <a:rPr lang="fr-FR" dirty="0"/>
+              <a:t> </a:t>
+            </a:r>
+            <a:r>
+              <a:rPr lang="fr-FR" dirty="0" err="1"/>
+              <a:t>addressed</a:t>
+            </a:r>
+            <a:endParaRPr lang="fr-FR" dirty="0"/>
+          </a:p>
+          <a:p>
+            <a:endParaRPr lang="fr-FR" dirty="0"/>
+          </a:p>
+          <a:p>
+            <a:endParaRPr lang="fr-FR" dirty="0"/>
+          </a:p>
+        </p:txBody>
+      </p:sp>
+      <p:pic>
+        <p:nvPicPr>
+          <p:cNvPr id="5" name="Image 4">
+            <a:extLst>
+              <a:ext uri="{FF2B5EF4-FFF2-40B4-BE49-F238E27FC236}">
+                <a16:creationId xmlns:a16="http://schemas.microsoft.com/office/drawing/2014/main" id="{2795080A-F80C-CE36-490B-9B7C1D2E065F}"/>
+              </a:ext>
+            </a:extLst>
+          </p:cNvPr>
+          <p:cNvPicPr>
+            <a:picLocks noChangeAspect="1"/>
+          </p:cNvPicPr>
+          <p:nvPr/>
+        </p:nvPicPr>
+        <p:blipFill>
+          <a:blip r:embed="rId2"/>
+          <a:stretch>
+            <a:fillRect/>
+          </a:stretch>
+        </p:blipFill>
+        <p:spPr>
+          <a:xfrm>
+            <a:off x="213360" y="1249680"/>
+            <a:ext cx="5244465" cy="4914563"/>
+          </a:xfrm>
+          <a:prstGeom prst="rect">
+            <a:avLst/>
+          </a:prstGeom>
+        </p:spPr>
+      </p:pic>
+      <p:sp>
+        <p:nvSpPr>
+          <p:cNvPr id="6" name="Flèche : haut 5">
+            <a:extLst>
+              <a:ext uri="{FF2B5EF4-FFF2-40B4-BE49-F238E27FC236}">
+                <a16:creationId xmlns:a16="http://schemas.microsoft.com/office/drawing/2014/main" id="{C766939B-CC16-7C21-D857-130CDCE09F8D}"/>
+              </a:ext>
+            </a:extLst>
+          </p:cNvPr>
+          <p:cNvSpPr/>
+          <p:nvPr/>
+        </p:nvSpPr>
+        <p:spPr>
+          <a:xfrm rot="17592154">
+            <a:off x="5024006" y="2212143"/>
+            <a:ext cx="464127" cy="644236"/>
+          </a:xfrm>
+          <a:prstGeom prst="upArrow">
+            <a:avLst/>
+          </a:prstGeom>
+          <a:solidFill>
+            <a:srgbClr val="FF0000"/>
+          </a:solidFill>
+        </p:spPr>
+        <p:style>
+          <a:lnRef idx="2">
+            <a:schemeClr val="accent1">
+              <a:shade val="15000"/>
+            </a:schemeClr>
+          </a:lnRef>
+          <a:fillRef idx="1">
+            <a:schemeClr val="accent1"/>
+          </a:fillRef>
+          <a:effectRef idx="0">
+            <a:schemeClr val="accent1"/>
+          </a:effectRef>
+          <a:fontRef idx="minor">
+            <a:schemeClr val="lt1"/>
+          </a:fontRef>
+        </p:style>
+        <p:txBody>
+          <a:bodyPr rtlCol="0" anchor="ctr"/>
+          <a:lstStyle/>
+          <a:p>
+            <a:pPr algn="ctr"/>
+            <a:endParaRPr lang="fr-FR"/>
+          </a:p>
+        </p:txBody>
+      </p:sp>
+      <p:sp>
+        <p:nvSpPr>
+          <p:cNvPr id="7" name="Flèche : haut 6">
+            <a:extLst>
+              <a:ext uri="{FF2B5EF4-FFF2-40B4-BE49-F238E27FC236}">
+                <a16:creationId xmlns:a16="http://schemas.microsoft.com/office/drawing/2014/main" id="{18BC7FE4-5F78-D634-4263-6FA6A93BA047}"/>
+              </a:ext>
+            </a:extLst>
+          </p:cNvPr>
+          <p:cNvSpPr/>
+          <p:nvPr/>
+        </p:nvSpPr>
+        <p:spPr>
+          <a:xfrm rot="14253562">
+            <a:off x="5032848" y="3242383"/>
+            <a:ext cx="464127" cy="644236"/>
+          </a:xfrm>
+          <a:prstGeom prst="upArrow">
+            <a:avLst/>
+          </a:prstGeom>
+          <a:solidFill>
+            <a:srgbClr val="FF0000"/>
+          </a:solidFill>
+        </p:spPr>
+        <p:style>
+          <a:lnRef idx="2">
+            <a:schemeClr val="accent1">
+              <a:shade val="15000"/>
+            </a:schemeClr>
+          </a:lnRef>
+          <a:fillRef idx="1">
+            <a:schemeClr val="accent1"/>
+          </a:fillRef>
+          <a:effectRef idx="0">
+            <a:schemeClr val="accent1"/>
+          </a:effectRef>
+          <a:fontRef idx="minor">
+            <a:schemeClr val="lt1"/>
+          </a:fontRef>
+        </p:style>
+        <p:txBody>
+          <a:bodyPr rtlCol="0" anchor="ctr"/>
+          <a:lstStyle/>
+          <a:p>
+            <a:pPr algn="ctr"/>
+            <a:endParaRPr lang="fr-FR"/>
+          </a:p>
+        </p:txBody>
+      </p:sp>
+    </p:spTree>
+    <p:extLst>
+      <p:ext uri="{BB962C8B-B14F-4D97-AF65-F5344CB8AC3E}">
+        <p14:creationId xmlns:p14="http://schemas.microsoft.com/office/powerpoint/2010/main" val="3454558438"/>
+      </p:ext>
+    </p:extLst>
+  </p:cSld>
+  <p:clrMapOvr>
+    <a:masterClrMapping/>
+  </p:clrMapOvr>
+</p:sld>
+</file>
+
+<file path=ppt/slides/slide6.xml><?xml version="1.0" encoding="utf-8"?>
+<p:sld xmlns:a="http://schemas.openxmlformats.org/drawingml/2006/main" xmlns:r="http://schemas.openxmlformats.org/officeDocument/2006/relationships" xmlns:p="http://schemas.openxmlformats.org/presentationml/2006/main">
+  <p:cSld>
+    <p:spTree>
+      <p:nvGrpSpPr>
+        <p:cNvPr id="1" name=""/>
+        <p:cNvGrpSpPr/>
+        <p:nvPr/>
+      </p:nvGrpSpPr>
+      <p:grpSpPr>
+        <a:xfrm>
+          <a:off x="0" y="0"/>
+          <a:ext cx="0" cy="0"/>
+          <a:chOff x="0" y="0"/>
+          <a:chExt cx="0" cy="0"/>
+        </a:xfrm>
+      </p:grpSpPr>
+      <p:sp>
+        <p:nvSpPr>
+          <p:cNvPr id="2" name="Titre 1">
+            <a:extLst>
+              <a:ext uri="{FF2B5EF4-FFF2-40B4-BE49-F238E27FC236}">
+                <a16:creationId xmlns:a16="http://schemas.microsoft.com/office/drawing/2014/main" id="{54A1E88B-4A50-17FA-A85B-9497818A7071}"/>
+              </a:ext>
+            </a:extLst>
+          </p:cNvPr>
+          <p:cNvSpPr>
+            <a:spLocks noGrp="1"/>
+          </p:cNvSpPr>
+          <p:nvPr>
+            <p:ph type="title"/>
+          </p:nvPr>
+        </p:nvSpPr>
+        <p:spPr/>
+        <p:txBody>
+          <a:bodyPr/>
+          <a:lstStyle/>
+          <a:p>
+            <a:r>
+              <a:rPr lang="fr-FR" dirty="0"/>
+              <a:t>About the notebooks</a:t>
+            </a:r>
+          </a:p>
+        </p:txBody>
+      </p:sp>
+      <p:sp>
+        <p:nvSpPr>
+          <p:cNvPr id="3" name="Espace réservé du contenu 2">
+            <a:extLst>
+              <a:ext uri="{FF2B5EF4-FFF2-40B4-BE49-F238E27FC236}">
+                <a16:creationId xmlns:a16="http://schemas.microsoft.com/office/drawing/2014/main" id="{0006FB1E-E832-F506-45C7-50EE301D0B05}"/>
+              </a:ext>
+            </a:extLst>
+          </p:cNvPr>
+          <p:cNvSpPr>
+            <a:spLocks noGrp="1"/>
+          </p:cNvSpPr>
+          <p:nvPr>
+            <p:ph idx="1"/>
+          </p:nvPr>
+        </p:nvSpPr>
+        <p:spPr>
+          <a:xfrm>
+            <a:off x="5644800" y="1249680"/>
+            <a:ext cx="5882640" cy="4927283"/>
+          </a:xfrm>
+        </p:spPr>
+        <p:txBody>
+          <a:bodyPr/>
+          <a:lstStyle/>
+          <a:p>
+            <a:r>
+              <a:rPr lang="fr-FR" dirty="0"/>
+              <a:t>Graphics </a:t>
+            </a:r>
+            <a:r>
+              <a:rPr lang="fr-FR" dirty="0" err="1"/>
+              <a:t>may</a:t>
+            </a:r>
+            <a:r>
+              <a:rPr lang="fr-FR" dirty="0"/>
+              <a:t> </a:t>
+            </a:r>
+            <a:r>
+              <a:rPr lang="fr-FR" dirty="0" err="1"/>
+              <a:t>be</a:t>
+            </a:r>
+            <a:r>
+              <a:rPr lang="fr-FR" dirty="0"/>
+              <a:t> </a:t>
+            </a:r>
+            <a:r>
+              <a:rPr lang="fr-FR" dirty="0" err="1"/>
+              <a:t>used</a:t>
+            </a:r>
+            <a:endParaRPr lang="fr-FR" dirty="0"/>
+          </a:p>
+          <a:p>
+            <a:r>
+              <a:rPr lang="fr-FR" dirty="0"/>
+              <a:t>You </a:t>
+            </a:r>
+            <a:r>
+              <a:rPr lang="fr-FR" dirty="0" err="1"/>
+              <a:t>may</a:t>
+            </a:r>
+            <a:r>
+              <a:rPr lang="fr-FR" dirty="0"/>
+              <a:t> have to click the </a:t>
+            </a:r>
+            <a:r>
+              <a:rPr lang="fr-FR" dirty="0" err="1"/>
+              <a:t>Visualization</a:t>
+            </a:r>
+            <a:r>
+              <a:rPr lang="fr-FR" dirty="0"/>
+              <a:t> tab</a:t>
+            </a:r>
+          </a:p>
+          <a:p>
+            <a:endParaRPr lang="fr-FR" dirty="0"/>
+          </a:p>
+          <a:p>
+            <a:endParaRPr lang="fr-FR" dirty="0"/>
+          </a:p>
+          <a:p>
+            <a:r>
+              <a:rPr lang="fr-FR" dirty="0"/>
+              <a:t>`</a:t>
+            </a:r>
+            <a:r>
+              <a:rPr lang="fr-FR" dirty="0" err="1"/>
+              <a:t>Comments</a:t>
+            </a:r>
+            <a:r>
+              <a:rPr lang="fr-FR" dirty="0"/>
+              <a:t>` sections of the </a:t>
+            </a:r>
+            <a:r>
+              <a:rPr lang="fr-FR" dirty="0" err="1"/>
+              <a:t>notbook</a:t>
+            </a:r>
+            <a:r>
+              <a:rPr lang="fr-FR" dirty="0"/>
+              <a:t> </a:t>
+            </a:r>
+            <a:r>
+              <a:rPr lang="fr-FR" dirty="0" err="1"/>
+              <a:t>either</a:t>
+            </a:r>
+            <a:r>
+              <a:rPr lang="fr-FR" dirty="0"/>
+              <a:t> </a:t>
+            </a:r>
+            <a:r>
+              <a:rPr lang="fr-FR" dirty="0" err="1"/>
+              <a:t>answers</a:t>
+            </a:r>
+            <a:r>
+              <a:rPr lang="fr-FR" dirty="0"/>
+              <a:t> the question or </a:t>
+            </a:r>
+            <a:r>
+              <a:rPr lang="fr-FR" dirty="0" err="1"/>
+              <a:t>underline</a:t>
+            </a:r>
+            <a:r>
+              <a:rPr lang="fr-FR" dirty="0"/>
+              <a:t> </a:t>
+            </a:r>
+            <a:r>
+              <a:rPr lang="fr-FR" dirty="0" err="1"/>
+              <a:t>some</a:t>
+            </a:r>
+            <a:r>
+              <a:rPr lang="fr-FR" dirty="0"/>
+              <a:t> </a:t>
+            </a:r>
+            <a:r>
+              <a:rPr lang="fr-FR" dirty="0" err="1"/>
+              <a:t>facts</a:t>
+            </a:r>
+            <a:endParaRPr lang="fr-FR" dirty="0"/>
+          </a:p>
+          <a:p>
+            <a:pPr lvl="1"/>
+            <a:endParaRPr lang="fr-FR" dirty="0"/>
+          </a:p>
+        </p:txBody>
+      </p:sp>
+      <p:pic>
+        <p:nvPicPr>
+          <p:cNvPr id="5" name="Image 4">
+            <a:extLst>
+              <a:ext uri="{FF2B5EF4-FFF2-40B4-BE49-F238E27FC236}">
+                <a16:creationId xmlns:a16="http://schemas.microsoft.com/office/drawing/2014/main" id="{81520DF2-72B8-6F56-80CE-7A098C984E5F}"/>
+              </a:ext>
+            </a:extLst>
+          </p:cNvPr>
+          <p:cNvPicPr>
+            <a:picLocks noChangeAspect="1"/>
+          </p:cNvPicPr>
+          <p:nvPr/>
+        </p:nvPicPr>
+        <p:blipFill>
+          <a:blip r:embed="rId2"/>
+          <a:stretch>
+            <a:fillRect/>
+          </a:stretch>
+        </p:blipFill>
+        <p:spPr>
+          <a:xfrm>
+            <a:off x="86985" y="1251129"/>
+            <a:ext cx="5394398" cy="3135676"/>
+          </a:xfrm>
+          <a:prstGeom prst="rect">
+            <a:avLst/>
+          </a:prstGeom>
+        </p:spPr>
+      </p:pic>
+      <p:sp>
+        <p:nvSpPr>
+          <p:cNvPr id="6" name="Flèche : haut 5">
+            <a:extLst>
+              <a:ext uri="{FF2B5EF4-FFF2-40B4-BE49-F238E27FC236}">
+                <a16:creationId xmlns:a16="http://schemas.microsoft.com/office/drawing/2014/main" id="{319E57BF-83E8-D8F8-033F-120C2C1D92A1}"/>
+              </a:ext>
+            </a:extLst>
+          </p:cNvPr>
+          <p:cNvSpPr/>
+          <p:nvPr/>
+        </p:nvSpPr>
+        <p:spPr>
+          <a:xfrm rot="16200000">
+            <a:off x="4836809" y="3886911"/>
+            <a:ext cx="464127" cy="644236"/>
+          </a:xfrm>
+          <a:prstGeom prst="upArrow">
+            <a:avLst/>
+          </a:prstGeom>
+          <a:solidFill>
+            <a:srgbClr val="FF0000"/>
+          </a:solidFill>
+        </p:spPr>
+        <p:style>
+          <a:lnRef idx="2">
+            <a:schemeClr val="accent1">
+              <a:shade val="15000"/>
+            </a:schemeClr>
+          </a:lnRef>
+          <a:fillRef idx="1">
+            <a:schemeClr val="accent1"/>
+          </a:fillRef>
+          <a:effectRef idx="0">
+            <a:schemeClr val="accent1"/>
+          </a:effectRef>
+          <a:fontRef idx="minor">
+            <a:schemeClr val="lt1"/>
+          </a:fontRef>
+        </p:style>
+        <p:txBody>
+          <a:bodyPr rtlCol="0" anchor="ctr"/>
+          <a:lstStyle/>
+          <a:p>
+            <a:pPr algn="ctr"/>
+            <a:endParaRPr lang="fr-FR"/>
+          </a:p>
+        </p:txBody>
+      </p:sp>
+      <p:sp>
+        <p:nvSpPr>
+          <p:cNvPr id="7" name="Flèche : haut 6">
+            <a:extLst>
+              <a:ext uri="{FF2B5EF4-FFF2-40B4-BE49-F238E27FC236}">
+                <a16:creationId xmlns:a16="http://schemas.microsoft.com/office/drawing/2014/main" id="{ADDDD8F1-8EC5-0A67-E1C4-FDF4AD008E81}"/>
+              </a:ext>
+            </a:extLst>
+          </p:cNvPr>
+          <p:cNvSpPr/>
+          <p:nvPr/>
+        </p:nvSpPr>
+        <p:spPr>
+          <a:xfrm rot="19156366">
+            <a:off x="898469" y="1901126"/>
+            <a:ext cx="464127" cy="644236"/>
+          </a:xfrm>
+          <a:prstGeom prst="upArrow">
+            <a:avLst/>
+          </a:prstGeom>
+          <a:solidFill>
+            <a:srgbClr val="FF0000"/>
+          </a:solidFill>
+        </p:spPr>
+        <p:style>
+          <a:lnRef idx="2">
+            <a:schemeClr val="accent1">
+              <a:shade val="15000"/>
+            </a:schemeClr>
+          </a:lnRef>
+          <a:fillRef idx="1">
+            <a:schemeClr val="accent1"/>
+          </a:fillRef>
+          <a:effectRef idx="0">
+            <a:schemeClr val="accent1"/>
+          </a:effectRef>
+          <a:fontRef idx="minor">
+            <a:schemeClr val="lt1"/>
+          </a:fontRef>
+        </p:style>
+        <p:txBody>
+          <a:bodyPr rtlCol="0" anchor="ctr"/>
+          <a:lstStyle/>
+          <a:p>
+            <a:pPr algn="ctr"/>
+            <a:endParaRPr lang="fr-FR"/>
+          </a:p>
+        </p:txBody>
+      </p:sp>
+    </p:spTree>
+    <p:extLst>
+      <p:ext uri="{BB962C8B-B14F-4D97-AF65-F5344CB8AC3E}">
+        <p14:creationId xmlns:p14="http://schemas.microsoft.com/office/powerpoint/2010/main" val="2740920124"/>
+      </p:ext>
+    </p:extLst>
+  </p:cSld>
+  <p:clrMapOvr>
+    <a:masterClrMapping/>
+  </p:clrMapOvr>
+</p:sld>
+</file>
+
+<file path=ppt/slides/slide7.xml><?xml version="1.0" encoding="utf-8"?>
+<p:sld xmlns:a="http://schemas.openxmlformats.org/drawingml/2006/main" xmlns:r="http://schemas.openxmlformats.org/officeDocument/2006/relationships" xmlns:p="http://schemas.openxmlformats.org/presentationml/2006/main">
+  <p:cSld>
+    <p:spTree>
+      <p:nvGrpSpPr>
+        <p:cNvPr id="1" name=""/>
+        <p:cNvGrpSpPr/>
+        <p:nvPr/>
+      </p:nvGrpSpPr>
+      <p:grpSpPr>
+        <a:xfrm>
+          <a:off x="0" y="0"/>
+          <a:ext cx="0" cy="0"/>
+          <a:chOff x="0" y="0"/>
+          <a:chExt cx="0" cy="0"/>
+        </a:xfrm>
+      </p:grpSpPr>
+      <p:sp>
+        <p:nvSpPr>
+          <p:cNvPr id="4" name="Titre 3">
+            <a:extLst>
+              <a:ext uri="{FF2B5EF4-FFF2-40B4-BE49-F238E27FC236}">
+                <a16:creationId xmlns:a16="http://schemas.microsoft.com/office/drawing/2014/main" id="{80E590DF-0A88-7056-85D1-A8E809E2318F}"/>
+              </a:ext>
+            </a:extLst>
+          </p:cNvPr>
+          <p:cNvSpPr>
+            <a:spLocks noGrp="1"/>
+          </p:cNvSpPr>
+          <p:nvPr>
+            <p:ph type="title"/>
+          </p:nvPr>
+        </p:nvSpPr>
+        <p:spPr>
+          <a:xfrm>
+            <a:off x="831850" y="1709738"/>
+            <a:ext cx="10515600" cy="1837859"/>
+          </a:xfrm>
+        </p:spPr>
+        <p:txBody>
+          <a:bodyPr/>
+          <a:lstStyle/>
+          <a:p>
+            <a:pPr algn="ctr"/>
+            <a:r>
+              <a:rPr lang="fr-FR" dirty="0"/>
+              <a:t>Code </a:t>
+            </a:r>
+            <a:r>
+              <a:rPr lang="fr-FR" dirty="0" err="1"/>
+              <a:t>Review</a:t>
+            </a:r>
+            <a:endParaRPr lang="fr-FR" dirty="0"/>
+          </a:p>
+        </p:txBody>
+      </p:sp>
+      <p:sp>
+        <p:nvSpPr>
+          <p:cNvPr id="5" name="Espace réservé du texte 4">
+            <a:extLst>
+              <a:ext uri="{FF2B5EF4-FFF2-40B4-BE49-F238E27FC236}">
+                <a16:creationId xmlns:a16="http://schemas.microsoft.com/office/drawing/2014/main" id="{64E8BF61-007C-0740-1AA1-06B9449B33C7}"/>
+              </a:ext>
+            </a:extLst>
+          </p:cNvPr>
+          <p:cNvSpPr>
+            <a:spLocks noGrp="1"/>
+          </p:cNvSpPr>
+          <p:nvPr>
+            <p:ph type="body" idx="1"/>
+          </p:nvPr>
+        </p:nvSpPr>
+        <p:spPr/>
+        <p:txBody>
+          <a:bodyPr/>
+          <a:lstStyle/>
+          <a:p>
+            <a:endParaRPr lang="fr-FR"/>
+          </a:p>
+        </p:txBody>
+      </p:sp>
+    </p:spTree>
+    <p:extLst>
+      <p:ext uri="{BB962C8B-B14F-4D97-AF65-F5344CB8AC3E}">
+        <p14:creationId xmlns:p14="http://schemas.microsoft.com/office/powerpoint/2010/main" val="312535264"/>
+      </p:ext>
+    </p:extLst>
+  </p:cSld>
+  <p:clrMapOvr>
+    <a:masterClrMapping/>
+  </p:clrMapOvr>
+</p:sld>
+</file>
+
+<file path=ppt/slides/slide8.xml><?xml version="1.0" encoding="utf-8"?>
+<p:sld xmlns:a="http://schemas.openxmlformats.org/drawingml/2006/main" xmlns:r="http://schemas.openxmlformats.org/officeDocument/2006/relationships" xmlns:p="http://schemas.openxmlformats.org/presentationml/2006/main">
+  <p:cSld>
+    <p:spTree>
+      <p:nvGrpSpPr>
+        <p:cNvPr id="1" name=""/>
+        <p:cNvGrpSpPr/>
+        <p:nvPr/>
+      </p:nvGrpSpPr>
+      <p:grpSpPr>
+        <a:xfrm>
+          <a:off x="0" y="0"/>
+          <a:ext cx="0" cy="0"/>
+          <a:chOff x="0" y="0"/>
+          <a:chExt cx="0" cy="0"/>
+        </a:xfrm>
+      </p:grpSpPr>
+      <p:sp>
+        <p:nvSpPr>
+          <p:cNvPr id="2" name="Titre 1">
+            <a:extLst>
+              <a:ext uri="{FF2B5EF4-FFF2-40B4-BE49-F238E27FC236}">
+                <a16:creationId xmlns:a16="http://schemas.microsoft.com/office/drawing/2014/main" id="{F13D07B4-C7D9-46E1-38A0-A6EEF16B48EB}"/>
+              </a:ext>
+            </a:extLst>
+          </p:cNvPr>
+          <p:cNvSpPr>
+            <a:spLocks noGrp="1"/>
+          </p:cNvSpPr>
+          <p:nvPr>
+            <p:ph type="title"/>
+          </p:nvPr>
+        </p:nvSpPr>
+        <p:spPr/>
+        <p:txBody>
+          <a:bodyPr/>
+          <a:lstStyle/>
+          <a:p>
             <a:r>
               <a:rPr lang="fr-FR" dirty="0" err="1"/>
               <a:t>Take</a:t>
@@ -5138,7 +6424,123 @@
           <a:bodyPr/>
           <a:lstStyle/>
           <a:p>
+            <a:r>
+              <a:rPr lang="fr-FR" dirty="0"/>
+              <a:t>Not </a:t>
+            </a:r>
+            <a:r>
+              <a:rPr lang="fr-FR" dirty="0" err="1"/>
+              <a:t>really</a:t>
+            </a:r>
+            <a:r>
+              <a:rPr lang="fr-FR" dirty="0"/>
+              <a:t> </a:t>
+            </a:r>
+            <a:r>
+              <a:rPr lang="fr-FR" dirty="0" err="1"/>
+              <a:t>impressed</a:t>
+            </a:r>
+            <a:r>
+              <a:rPr lang="fr-FR" dirty="0"/>
+              <a:t> by the speed</a:t>
+            </a:r>
+          </a:p>
+          <a:p>
+            <a:pPr lvl="1"/>
+            <a:r>
+              <a:rPr lang="fr-FR" dirty="0"/>
+              <a:t>May </a:t>
+            </a:r>
+            <a:r>
+              <a:rPr lang="fr-FR" dirty="0" err="1"/>
+              <a:t>be</a:t>
+            </a:r>
+            <a:r>
+              <a:rPr lang="fr-FR" dirty="0"/>
+              <a:t> </a:t>
+            </a:r>
+            <a:r>
+              <a:rPr lang="fr-FR" dirty="0" err="1"/>
+              <a:t>this</a:t>
+            </a:r>
+            <a:r>
+              <a:rPr lang="fr-FR" dirty="0"/>
+              <a:t> </a:t>
+            </a:r>
+            <a:r>
+              <a:rPr lang="fr-FR" dirty="0" err="1"/>
+              <a:t>is</a:t>
+            </a:r>
+            <a:r>
+              <a:rPr lang="fr-FR" dirty="0"/>
+              <a:t> a </a:t>
+            </a:r>
+            <a:r>
+              <a:rPr lang="fr-FR" dirty="0" err="1"/>
+              <a:t>limitationof</a:t>
+            </a:r>
+            <a:r>
+              <a:rPr lang="fr-FR" dirty="0"/>
+              <a:t> the Community Edition</a:t>
+            </a:r>
+          </a:p>
+          <a:p>
+            <a:r>
+              <a:rPr lang="fr-FR" dirty="0" err="1"/>
+              <a:t>Sometimes</a:t>
+            </a:r>
+            <a:r>
+              <a:rPr lang="fr-FR" dirty="0"/>
+              <a:t> </a:t>
+            </a:r>
+            <a:r>
+              <a:rPr lang="fr-FR" dirty="0" err="1"/>
+              <a:t>obvious</a:t>
+            </a:r>
+            <a:r>
+              <a:rPr lang="fr-FR" dirty="0"/>
+              <a:t> </a:t>
+            </a:r>
+            <a:r>
+              <a:rPr lang="fr-FR" dirty="0" err="1"/>
+              <a:t>tasks</a:t>
+            </a:r>
+            <a:r>
+              <a:rPr lang="fr-FR" dirty="0"/>
+              <a:t> </a:t>
+            </a:r>
+            <a:r>
+              <a:rPr lang="fr-FR" dirty="0" err="1"/>
+              <a:t>seems</a:t>
+            </a:r>
+            <a:r>
+              <a:rPr lang="fr-FR" dirty="0"/>
+              <a:t> </a:t>
+            </a:r>
+            <a:r>
+              <a:rPr lang="fr-FR" dirty="0" err="1"/>
+              <a:t>overcomplicated</a:t>
+            </a:r>
             <a:endParaRPr lang="fr-FR" dirty="0"/>
+          </a:p>
+          <a:p>
+            <a:pPr lvl="1"/>
+            <a:r>
+              <a:rPr lang="fr-FR" dirty="0" err="1"/>
+              <a:t>See</a:t>
+            </a:r>
+            <a:r>
+              <a:rPr lang="fr-FR" dirty="0"/>
+              <a:t> de % display </a:t>
+            </a:r>
+            <a:r>
+              <a:rPr lang="fr-FR" dirty="0" err="1"/>
+              <a:t>with</a:t>
+            </a:r>
+            <a:r>
+              <a:rPr lang="fr-FR" dirty="0"/>
+              <a:t> 2 digits in part 3, question 2</a:t>
+            </a:r>
           </a:p>
         </p:txBody>
       </p:sp>

</xml_diff>

<commit_message>
relecture, update des slides etc.
</commit_message>
<xml_diff>
--- a/04_big_data/99_Project_Steam/steam_project.pptx
+++ b/04_big_data/99_Project_Steam/steam_project.pptx
@@ -125,7 +125,7 @@
 <file path=ppt/revisionInfo.xml><?xml version="1.0" encoding="utf-8"?>
 <p1510:revInfo xmlns:a="http://schemas.openxmlformats.org/drawingml/2006/main" xmlns:r="http://schemas.openxmlformats.org/officeDocument/2006/relationships" xmlns:p1510="http://schemas.microsoft.com/office/powerpoint/2015/10/main">
   <p1510:revLst>
-    <p1510:client id="{FB309223-E9E0-44D1-8A29-32821B1882E7}" v="14" dt="2024-08-22T08:11:52.640"/>
+    <p1510:client id="{FB309223-E9E0-44D1-8A29-32821B1882E7}" v="15" dt="2024-08-24T09:44:16.010"/>
   </p1510:revLst>
 </p1510:revInfo>
 </file>
@@ -135,12 +135,12 @@
   <pc:docChgLst>
     <pc:chgData name="Philippe Baucour" userId="5102170ae7533958" providerId="LiveId" clId="{FB309223-E9E0-44D1-8A29-32821B1882E7}"/>
     <pc:docChg chg="undo custSel addSld delSld modSld sldOrd">
-      <pc:chgData name="Philippe Baucour" userId="5102170ae7533958" providerId="LiveId" clId="{FB309223-E9E0-44D1-8A29-32821B1882E7}" dt="2024-08-22T08:17:57.112" v="1035"/>
+      <pc:chgData name="Philippe Baucour" userId="5102170ae7533958" providerId="LiveId" clId="{FB309223-E9E0-44D1-8A29-32821B1882E7}" dt="2024-08-24T09:45:06.939" v="1048" actId="27636"/>
       <pc:docMkLst>
         <pc:docMk/>
       </pc:docMkLst>
       <pc:sldChg chg="modSp mod">
-        <pc:chgData name="Philippe Baucour" userId="5102170ae7533958" providerId="LiveId" clId="{FB309223-E9E0-44D1-8A29-32821B1882E7}" dt="2024-08-22T08:12:21.633" v="1033" actId="27636"/>
+        <pc:chgData name="Philippe Baucour" userId="5102170ae7533958" providerId="LiveId" clId="{FB309223-E9E0-44D1-8A29-32821B1882E7}" dt="2024-08-24T09:45:06.939" v="1048" actId="27636"/>
         <pc:sldMkLst>
           <pc:docMk/>
           <pc:sldMk cId="1392602265" sldId="256"/>
@@ -154,7 +154,7 @@
           </ac:spMkLst>
         </pc:spChg>
         <pc:spChg chg="mod">
-          <ac:chgData name="Philippe Baucour" userId="5102170ae7533958" providerId="LiveId" clId="{FB309223-E9E0-44D1-8A29-32821B1882E7}" dt="2024-08-22T08:12:21.633" v="1033" actId="27636"/>
+          <ac:chgData name="Philippe Baucour" userId="5102170ae7533958" providerId="LiveId" clId="{FB309223-E9E0-44D1-8A29-32821B1882E7}" dt="2024-08-24T09:45:06.939" v="1048" actId="27636"/>
           <ac:spMkLst>
             <pc:docMk/>
             <pc:sldMk cId="1392602265" sldId="256"/>
@@ -1564,7 +1564,7 @@
           <a:p>
             <a:fld id="{FD1752CD-A7D2-4825-BC26-9DAEFBD0A5FF}" type="datetimeFigureOut">
               <a:rPr lang="fr-FR" smtClean="0"/>
-              <a:t>22/08/2024</a:t>
+              <a:t>24/08/2024</a:t>
             </a:fld>
             <a:endParaRPr lang="fr-FR"/>
           </a:p>
@@ -1978,7 +1978,7 @@
           <a:p>
             <a:fld id="{7ECB9D5A-E5E4-41FE-AF39-634902D6D5D2}" type="datetimeFigureOut">
               <a:rPr lang="fr-FR" smtClean="0"/>
-              <a:t>22/08/2024</a:t>
+              <a:t>24/08/2024</a:t>
             </a:fld>
             <a:endParaRPr lang="fr-FR"/>
           </a:p>
@@ -2176,7 +2176,7 @@
           <a:p>
             <a:fld id="{7ECB9D5A-E5E4-41FE-AF39-634902D6D5D2}" type="datetimeFigureOut">
               <a:rPr lang="fr-FR" smtClean="0"/>
-              <a:t>22/08/2024</a:t>
+              <a:t>24/08/2024</a:t>
             </a:fld>
             <a:endParaRPr lang="fr-FR"/>
           </a:p>
@@ -2384,7 +2384,7 @@
           <a:p>
             <a:fld id="{7ECB9D5A-E5E4-41FE-AF39-634902D6D5D2}" type="datetimeFigureOut">
               <a:rPr lang="fr-FR" smtClean="0"/>
-              <a:t>22/08/2024</a:t>
+              <a:t>24/08/2024</a:t>
             </a:fld>
             <a:endParaRPr lang="fr-FR"/>
           </a:p>
@@ -2582,7 +2582,7 @@
           <a:p>
             <a:fld id="{7ECB9D5A-E5E4-41FE-AF39-634902D6D5D2}" type="datetimeFigureOut">
               <a:rPr lang="fr-FR" smtClean="0"/>
-              <a:t>22/08/2024</a:t>
+              <a:t>24/08/2024</a:t>
             </a:fld>
             <a:endParaRPr lang="fr-FR"/>
           </a:p>
@@ -2857,7 +2857,7 @@
           <a:p>
             <a:fld id="{7ECB9D5A-E5E4-41FE-AF39-634902D6D5D2}" type="datetimeFigureOut">
               <a:rPr lang="fr-FR" smtClean="0"/>
-              <a:t>22/08/2024</a:t>
+              <a:t>24/08/2024</a:t>
             </a:fld>
             <a:endParaRPr lang="fr-FR"/>
           </a:p>
@@ -3122,7 +3122,7 @@
           <a:p>
             <a:fld id="{7ECB9D5A-E5E4-41FE-AF39-634902D6D5D2}" type="datetimeFigureOut">
               <a:rPr lang="fr-FR" smtClean="0"/>
-              <a:t>22/08/2024</a:t>
+              <a:t>24/08/2024</a:t>
             </a:fld>
             <a:endParaRPr lang="fr-FR"/>
           </a:p>
@@ -3534,7 +3534,7 @@
           <a:p>
             <a:fld id="{7ECB9D5A-E5E4-41FE-AF39-634902D6D5D2}" type="datetimeFigureOut">
               <a:rPr lang="fr-FR" smtClean="0"/>
-              <a:t>22/08/2024</a:t>
+              <a:t>24/08/2024</a:t>
             </a:fld>
             <a:endParaRPr lang="fr-FR"/>
           </a:p>
@@ -3675,7 +3675,7 @@
           <a:p>
             <a:fld id="{7ECB9D5A-E5E4-41FE-AF39-634902D6D5D2}" type="datetimeFigureOut">
               <a:rPr lang="fr-FR" smtClean="0"/>
-              <a:t>22/08/2024</a:t>
+              <a:t>24/08/2024</a:t>
             </a:fld>
             <a:endParaRPr lang="fr-FR"/>
           </a:p>
@@ -3788,7 +3788,7 @@
           <a:p>
             <a:fld id="{7ECB9D5A-E5E4-41FE-AF39-634902D6D5D2}" type="datetimeFigureOut">
               <a:rPr lang="fr-FR" smtClean="0"/>
-              <a:t>22/08/2024</a:t>
+              <a:t>24/08/2024</a:t>
             </a:fld>
             <a:endParaRPr lang="fr-FR"/>
           </a:p>
@@ -4099,7 +4099,7 @@
           <a:p>
             <a:fld id="{7ECB9D5A-E5E4-41FE-AF39-634902D6D5D2}" type="datetimeFigureOut">
               <a:rPr lang="fr-FR" smtClean="0"/>
-              <a:t>22/08/2024</a:t>
+              <a:t>24/08/2024</a:t>
             </a:fld>
             <a:endParaRPr lang="fr-FR"/>
           </a:p>
@@ -4390,7 +4390,7 @@
           <a:p>
             <a:fld id="{7ECB9D5A-E5E4-41FE-AF39-634902D6D5D2}" type="datetimeFigureOut">
               <a:rPr lang="fr-FR" smtClean="0"/>
-              <a:t>22/08/2024</a:t>
+              <a:t>24/08/2024</a:t>
             </a:fld>
             <a:endParaRPr lang="fr-FR"/>
           </a:p>
@@ -4631,7 +4631,7 @@
           <a:p>
             <a:fld id="{7ECB9D5A-E5E4-41FE-AF39-634902D6D5D2}" type="datetimeFigureOut">
               <a:rPr lang="fr-FR" smtClean="0"/>
-              <a:t>22/08/2024</a:t>
+              <a:t>24/08/2024</a:t>
             </a:fld>
             <a:endParaRPr lang="fr-FR"/>
           </a:p>
@@ -5095,12 +5095,12 @@
         <p:spPr>
           <a:xfrm>
             <a:off x="225552" y="3602038"/>
-            <a:ext cx="11740896" cy="1655762"/>
+            <a:ext cx="11740896" cy="3005018"/>
           </a:xfrm>
         </p:spPr>
         <p:txBody>
           <a:bodyPr>
-            <a:normAutofit fontScale="77500" lnSpcReduction="20000"/>
+            <a:normAutofit/>
           </a:bodyPr>
           <a:lstStyle/>
           <a:p>
@@ -5160,31 +5160,47 @@
           <a:p>
             <a:pPr algn="l"/>
             <a:r>
-              <a:rPr lang="fr-FR" sz="1100" dirty="0">
+              <a:rPr lang="fr-FR" sz="900" dirty="0">
                 <a:hlinkClick r:id="rId5"/>
               </a:rPr>
               <a:t>https://databricks-prod-cloudfront.cloud.databricks.com/public/4027ec902e239c93eaaa8714f173bcfc/3208668746250363/3820867594722529/1163468565521033/latest.html</a:t>
             </a:r>
-            <a:endParaRPr lang="fr-FR" sz="1100" dirty="0"/>
+            <a:endParaRPr lang="fr-FR" sz="900" dirty="0"/>
           </a:p>
           <a:p>
             <a:pPr algn="l"/>
             <a:r>
-              <a:rPr lang="en-US" sz="1100" dirty="0">
+              <a:rPr lang="en-US" sz="900" dirty="0">
                 <a:hlinkClick r:id="rId6"/>
               </a:rPr>
               <a:t>https://databricks-prod-cloudfront.cloud.databricks.com/public/4027ec902e239c93eaaa8714f173bcfc/3208668746250363/3820867594722590/1163468565521033/latest.html</a:t>
             </a:r>
-            <a:endParaRPr lang="en-US" sz="1100" dirty="0"/>
+            <a:endParaRPr lang="en-US" sz="900" dirty="0"/>
           </a:p>
           <a:p>
             <a:pPr algn="l"/>
             <a:r>
-              <a:rPr lang="en-US" sz="1100" dirty="0">
+              <a:rPr lang="en-US" sz="900" dirty="0">
                 <a:hlinkClick r:id="rId7"/>
               </a:rPr>
               <a:t>https://databricks-prod-cloudfront.cloud.databricks.com/public/4027ec902e239c93eaaa8714f173bcfc/3208668746250363/3391531865810786/1163468565521033/latest.html</a:t>
             </a:r>
+            <a:endParaRPr lang="en-US" sz="900" dirty="0"/>
+          </a:p>
+          <a:p>
+            <a:pPr algn="l"/>
+            <a:endParaRPr lang="en-US" sz="1100" dirty="0"/>
+          </a:p>
+          <a:p>
+            <a:pPr algn="l"/>
+            <a:r>
+              <a:rPr lang="en-US" sz="1400" dirty="0"/>
+              <a:t>The content of the following slides is mainly a cut-and-paste of what's already available in the project notebook(s). The idea is that the slides can be used to guide and frame the presentation and discussion.</a:t>
+            </a:r>
+            <a:endParaRPr lang="fr-FR" sz="1400" dirty="0"/>
+          </a:p>
+          <a:p>
+            <a:pPr algn="l"/>
             <a:endParaRPr lang="en-US" sz="1100" dirty="0"/>
           </a:p>
         </p:txBody>

</xml_diff>